<commit_message>
TD learning is updated
</commit_message>
<xml_diff>
--- a/materials/3_Voon.pptx
+++ b/materials/3_Voon.pptx
@@ -123,6 +123,11 @@
       </a:defRPr>
     </a:lvl9pPr>
   </p:defaultTextStyle>
+  <p:extLst>
+    <p:ext uri="{EFAFB233-063F-42B5-8137-9DF3F51BA10A}">
+      <p15:sldGuideLst xmlns:p15="http://schemas.microsoft.com/office/powerpoint/2012/main"/>
+    </p:ext>
+  </p:extLst>
 </p:presentation>
 </file>
 
@@ -273,7 +278,7 @@
           <a:p>
             <a:fld id="{CDAAA7BD-420E-5C47-A313-07FF34A5FAB0}" type="datetimeFigureOut">
               <a:rPr lang="en-US" smtClean="0"/>
-              <a:t>5/30/19</a:t>
+              <a:t>6/2/19</a:t>
             </a:fld>
             <a:endParaRPr lang="en-US"/>
           </a:p>
@@ -471,7 +476,7 @@
           <a:p>
             <a:fld id="{CDAAA7BD-420E-5C47-A313-07FF34A5FAB0}" type="datetimeFigureOut">
               <a:rPr lang="en-US" smtClean="0"/>
-              <a:t>5/30/19</a:t>
+              <a:t>6/2/19</a:t>
             </a:fld>
             <a:endParaRPr lang="en-US"/>
           </a:p>
@@ -679,7 +684,7 @@
           <a:p>
             <a:fld id="{CDAAA7BD-420E-5C47-A313-07FF34A5FAB0}" type="datetimeFigureOut">
               <a:rPr lang="en-US" smtClean="0"/>
-              <a:t>5/30/19</a:t>
+              <a:t>6/2/19</a:t>
             </a:fld>
             <a:endParaRPr lang="en-US"/>
           </a:p>
@@ -877,7 +882,7 @@
           <a:p>
             <a:fld id="{CDAAA7BD-420E-5C47-A313-07FF34A5FAB0}" type="datetimeFigureOut">
               <a:rPr lang="en-US" smtClean="0"/>
-              <a:t>5/30/19</a:t>
+              <a:t>6/2/19</a:t>
             </a:fld>
             <a:endParaRPr lang="en-US"/>
           </a:p>
@@ -1152,7 +1157,7 @@
           <a:p>
             <a:fld id="{CDAAA7BD-420E-5C47-A313-07FF34A5FAB0}" type="datetimeFigureOut">
               <a:rPr lang="en-US" smtClean="0"/>
-              <a:t>5/30/19</a:t>
+              <a:t>6/2/19</a:t>
             </a:fld>
             <a:endParaRPr lang="en-US"/>
           </a:p>
@@ -1417,7 +1422,7 @@
           <a:p>
             <a:fld id="{CDAAA7BD-420E-5C47-A313-07FF34A5FAB0}" type="datetimeFigureOut">
               <a:rPr lang="en-US" smtClean="0"/>
-              <a:t>5/30/19</a:t>
+              <a:t>6/2/19</a:t>
             </a:fld>
             <a:endParaRPr lang="en-US"/>
           </a:p>
@@ -1829,7 +1834,7 @@
           <a:p>
             <a:fld id="{CDAAA7BD-420E-5C47-A313-07FF34A5FAB0}" type="datetimeFigureOut">
               <a:rPr lang="en-US" smtClean="0"/>
-              <a:t>5/30/19</a:t>
+              <a:t>6/2/19</a:t>
             </a:fld>
             <a:endParaRPr lang="en-US"/>
           </a:p>
@@ -1970,7 +1975,7 @@
           <a:p>
             <a:fld id="{CDAAA7BD-420E-5C47-A313-07FF34A5FAB0}" type="datetimeFigureOut">
               <a:rPr lang="en-US" smtClean="0"/>
-              <a:t>5/30/19</a:t>
+              <a:t>6/2/19</a:t>
             </a:fld>
             <a:endParaRPr lang="en-US"/>
           </a:p>
@@ -2083,7 +2088,7 @@
           <a:p>
             <a:fld id="{CDAAA7BD-420E-5C47-A313-07FF34A5FAB0}" type="datetimeFigureOut">
               <a:rPr lang="en-US" smtClean="0"/>
-              <a:t>5/30/19</a:t>
+              <a:t>6/2/19</a:t>
             </a:fld>
             <a:endParaRPr lang="en-US"/>
           </a:p>
@@ -2394,7 +2399,7 @@
           <a:p>
             <a:fld id="{CDAAA7BD-420E-5C47-A313-07FF34A5FAB0}" type="datetimeFigureOut">
               <a:rPr lang="en-US" smtClean="0"/>
-              <a:t>5/30/19</a:t>
+              <a:t>6/2/19</a:t>
             </a:fld>
             <a:endParaRPr lang="en-US"/>
           </a:p>
@@ -2682,7 +2687,7 @@
           <a:p>
             <a:fld id="{CDAAA7BD-420E-5C47-A313-07FF34A5FAB0}" type="datetimeFigureOut">
               <a:rPr lang="en-US" smtClean="0"/>
-              <a:t>5/30/19</a:t>
+              <a:t>6/2/19</a:t>
             </a:fld>
             <a:endParaRPr lang="en-US"/>
           </a:p>
@@ -2923,7 +2928,7 @@
           <a:p>
             <a:fld id="{CDAAA7BD-420E-5C47-A313-07FF34A5FAB0}" type="datetimeFigureOut">
               <a:rPr lang="en-US" smtClean="0"/>
-              <a:t>5/30/19</a:t>
+              <a:t>6/2/19</a:t>
             </a:fld>
             <a:endParaRPr lang="en-US"/>
           </a:p>
@@ -3470,8 +3475,8 @@
           </a:p>
         </p:txBody>
       </p:sp>
-      <mc:AlternateContent xmlns:mc="http://schemas.openxmlformats.org/markup-compatibility/2006">
-        <mc:Choice xmlns:a14="http://schemas.microsoft.com/office/drawing/2010/main" Requires="a14">
+      <mc:AlternateContent xmlns:mc="http://schemas.openxmlformats.org/markup-compatibility/2006" xmlns:a14="http://schemas.microsoft.com/office/drawing/2010/main">
+        <mc:Choice Requires="a14">
           <p:sp>
             <p:nvSpPr>
               <p:cNvPr id="5" name="TextBox 4">
@@ -3500,6 +3505,7 @@
               </a:bodyPr>
               <a:lstStyle/>
               <a:p>
+                <a:pPr/>
                 <a14:m>
                   <m:oMathPara xmlns:m="http://schemas.openxmlformats.org/officeDocument/2006/math">
                     <m:oMathParaPr>
@@ -3855,7 +3861,7 @@
             </p:txBody>
           </p:sp>
         </mc:Choice>
-        <mc:Fallback>
+        <mc:Fallback xmlns="">
           <p:sp>
             <p:nvSpPr>
               <p:cNvPr id="5" name="TextBox 4">
@@ -3970,8 +3976,8 @@
           </a:p>
         </p:txBody>
       </p:sp>
-      <mc:AlternateContent xmlns:mc="http://schemas.openxmlformats.org/markup-compatibility/2006">
-        <mc:Choice xmlns:a14="http://schemas.microsoft.com/office/drawing/2010/main" Requires="a14">
+      <mc:AlternateContent xmlns:mc="http://schemas.openxmlformats.org/markup-compatibility/2006" xmlns:a14="http://schemas.microsoft.com/office/drawing/2010/main">
+        <mc:Choice Requires="a14">
           <p:sp>
             <p:nvSpPr>
               <p:cNvPr id="8" name="TextBox 7">
@@ -4000,6 +4006,7 @@
               </a:bodyPr>
               <a:lstStyle/>
               <a:p>
+                <a:pPr/>
                 <a14:m>
                   <m:oMathPara xmlns:m="http://schemas.openxmlformats.org/officeDocument/2006/math">
                     <m:oMathParaPr>
@@ -4259,7 +4266,7 @@
             </p:txBody>
           </p:sp>
         </mc:Choice>
-        <mc:Fallback>
+        <mc:Fallback xmlns="">
           <p:sp>
             <p:nvSpPr>
               <p:cNvPr id="8" name="TextBox 7">
@@ -4426,8 +4433,8 @@
           </a:p>
         </p:txBody>
       </p:sp>
-      <mc:AlternateContent xmlns:mc="http://schemas.openxmlformats.org/markup-compatibility/2006">
-        <mc:Choice xmlns:a14="http://schemas.microsoft.com/office/drawing/2010/main" Requires="a14">
+      <mc:AlternateContent xmlns:mc="http://schemas.openxmlformats.org/markup-compatibility/2006" xmlns:a14="http://schemas.microsoft.com/office/drawing/2010/main">
+        <mc:Choice Requires="a14">
           <p:sp>
             <p:nvSpPr>
               <p:cNvPr id="5" name="TextBox 4">
@@ -4456,6 +4463,7 @@
               </a:bodyPr>
               <a:lstStyle/>
               <a:p>
+                <a:pPr/>
                 <a14:m>
                   <m:oMathPara xmlns:m="http://schemas.openxmlformats.org/officeDocument/2006/math">
                     <m:oMathParaPr>
@@ -5323,7 +5331,7 @@
             </p:txBody>
           </p:sp>
         </mc:Choice>
-        <mc:Fallback>
+        <mc:Fallback xmlns="">
           <p:sp>
             <p:nvSpPr>
               <p:cNvPr id="5" name="TextBox 4">
@@ -5368,8 +5376,8 @@
           </p:sp>
         </mc:Fallback>
       </mc:AlternateContent>
-      <mc:AlternateContent xmlns:mc="http://schemas.openxmlformats.org/markup-compatibility/2006">
-        <mc:Choice xmlns:a14="http://schemas.microsoft.com/office/drawing/2010/main" Requires="a14">
+      <mc:AlternateContent xmlns:mc="http://schemas.openxmlformats.org/markup-compatibility/2006" xmlns:a14="http://schemas.microsoft.com/office/drawing/2010/main">
+        <mc:Choice Requires="a14">
           <p:sp>
             <p:nvSpPr>
               <p:cNvPr id="6" name="TextBox 5">
@@ -5549,7 +5557,7 @@
             </p:txBody>
           </p:sp>
         </mc:Choice>
-        <mc:Fallback>
+        <mc:Fallback xmlns="">
           <p:sp>
             <p:nvSpPr>
               <p:cNvPr id="6" name="TextBox 5">
@@ -9488,8 +9496,8 @@
           <a:chExt cx="0" cy="0"/>
         </a:xfrm>
       </p:grpSpPr>
-      <mc:AlternateContent xmlns:mc="http://schemas.openxmlformats.org/markup-compatibility/2006">
-        <mc:Choice xmlns:a14="http://schemas.microsoft.com/office/drawing/2010/main" Requires="a14">
+      <mc:AlternateContent xmlns:mc="http://schemas.openxmlformats.org/markup-compatibility/2006" xmlns:a14="http://schemas.microsoft.com/office/drawing/2010/main">
+        <mc:Choice Requires="a14">
           <p:sp>
             <p:nvSpPr>
               <p:cNvPr id="4" name="TextBox 3">
@@ -9536,6 +9544,7 @@
                 </a:r>
               </a:p>
               <a:p>
+                <a:pPr/>
                 <a14:m>
                   <m:oMathPara xmlns:m="http://schemas.openxmlformats.org/officeDocument/2006/math">
                     <m:oMathParaPr>
@@ -9705,6 +9714,7 @@
                 </a:endParaRPr>
               </a:p>
               <a:p>
+                <a:pPr/>
                 <a14:m>
                   <m:oMathPara xmlns:m="http://schemas.openxmlformats.org/officeDocument/2006/math">
                     <m:oMathParaPr>
@@ -9837,7 +9847,7 @@
             </p:txBody>
           </p:sp>
         </mc:Choice>
-        <mc:Fallback>
+        <mc:Fallback xmlns="">
           <p:sp>
             <p:nvSpPr>
               <p:cNvPr id="4" name="TextBox 3">
@@ -9882,8 +9892,8 @@
           </p:sp>
         </mc:Fallback>
       </mc:AlternateContent>
-      <mc:AlternateContent xmlns:mc="http://schemas.openxmlformats.org/markup-compatibility/2006">
-        <mc:Choice xmlns:a14="http://schemas.microsoft.com/office/drawing/2010/main" Requires="a14">
+      <mc:AlternateContent xmlns:mc="http://schemas.openxmlformats.org/markup-compatibility/2006" xmlns:a14="http://schemas.microsoft.com/office/drawing/2010/main">
+        <mc:Choice Requires="a14">
           <p:sp>
             <p:nvSpPr>
               <p:cNvPr id="5" name="TextBox 4">
@@ -10601,7 +10611,7 @@
             </p:txBody>
           </p:sp>
         </mc:Choice>
-        <mc:Fallback>
+        <mc:Fallback xmlns="">
           <p:sp>
             <p:nvSpPr>
               <p:cNvPr id="5" name="TextBox 4">
@@ -10646,8 +10656,8 @@
           </p:sp>
         </mc:Fallback>
       </mc:AlternateContent>
-      <mc:AlternateContent xmlns:mc="http://schemas.openxmlformats.org/markup-compatibility/2006">
-        <mc:Choice xmlns:a14="http://schemas.microsoft.com/office/drawing/2010/main" Requires="a14">
+      <mc:AlternateContent xmlns:mc="http://schemas.openxmlformats.org/markup-compatibility/2006" xmlns:a14="http://schemas.microsoft.com/office/drawing/2010/main">
+        <mc:Choice Requires="a14">
           <p:sp>
             <p:nvSpPr>
               <p:cNvPr id="6" name="TextBox 5">
@@ -11171,13 +11181,7 @@
                               <a:rPr lang="en-US" sz="2800" b="0" i="1" smtClean="0">
                                 <a:latin typeface="Cambria Math" panose="02040503050406030204" pitchFamily="18" charset="0"/>
                               </a:rPr>
-                              <m:t>+1</m:t>
-                            </m:r>
-                            <m:r>
-                              <a:rPr lang="en-US" sz="2800" b="0" i="1" smtClean="0">
-                                <a:latin typeface="Cambria Math" panose="02040503050406030204" pitchFamily="18" charset="0"/>
-                              </a:rPr>
-                              <m:t>,</m:t>
+                              <m:t>+1,</m:t>
                             </m:r>
                             <m:r>
                               <a:rPr lang="en-US" sz="2800" b="0" i="1" smtClean="0">
@@ -11205,7 +11209,7 @@
             </p:txBody>
           </p:sp>
         </mc:Choice>
-        <mc:Fallback>
+        <mc:Fallback xmlns="">
           <p:sp>
             <p:nvSpPr>
               <p:cNvPr id="6" name="TextBox 5">
@@ -11365,7 +11369,7 @@
         <p:spPr>
           <a:xfrm>
             <a:off x="0" y="834190"/>
-            <a:ext cx="8916223" cy="1077218"/>
+            <a:ext cx="10794493" cy="1015663"/>
           </a:xfrm>
           <a:prstGeom prst="rect">
             <a:avLst/>
@@ -11386,12 +11390,9 @@
           <a:p>
             <a:r>
               <a:rPr lang="en-US" sz="2800" dirty="0"/>
-              <a:t>*black is old value, red is new value, green is updated again</a:t>
-            </a:r>
-            <a:r>
-              <a:rPr lang="en-US" sz="3200" dirty="0"/>
-              <a:t> </a:t>
-            </a:r>
+              <a:t>*black, red and green color indicates old, updated and re-updated value. </a:t>
+            </a:r>
+            <a:endParaRPr lang="en-US" sz="3200" dirty="0"/>
           </a:p>
         </p:txBody>
       </p:sp>
@@ -11430,8 +11431,8 @@
           </a:p>
         </p:txBody>
       </p:sp>
-      <mc:AlternateContent xmlns:mc="http://schemas.openxmlformats.org/markup-compatibility/2006">
-        <mc:Choice xmlns:a14="http://schemas.microsoft.com/office/drawing/2010/main" Requires="a14">
+      <mc:AlternateContent xmlns:mc="http://schemas.openxmlformats.org/markup-compatibility/2006" xmlns:a14="http://schemas.microsoft.com/office/drawing/2010/main">
+        <mc:Choice Requires="a14">
           <p:sp>
             <p:nvSpPr>
               <p:cNvPr id="7" name="Rectangle 6">
@@ -11953,7 +11954,7 @@
             </p:txBody>
           </p:sp>
         </mc:Choice>
-        <mc:Fallback>
+        <mc:Fallback xmlns="">
           <p:sp>
             <p:nvSpPr>
               <p:cNvPr id="7" name="Rectangle 6">
@@ -12033,8 +12034,8 @@
           </a:p>
         </p:txBody>
       </p:sp>
-      <mc:AlternateContent xmlns:mc="http://schemas.openxmlformats.org/markup-compatibility/2006">
-        <mc:Choice xmlns:a14="http://schemas.microsoft.com/office/drawing/2010/main" Requires="a14">
+      <mc:AlternateContent xmlns:mc="http://schemas.openxmlformats.org/markup-compatibility/2006" xmlns:a14="http://schemas.microsoft.com/office/drawing/2010/main">
+        <mc:Choice Requires="a14">
           <p:sp>
             <p:nvSpPr>
               <p:cNvPr id="9" name="Rectangle 8">
@@ -12480,7 +12481,7 @@
             </p:txBody>
           </p:sp>
         </mc:Choice>
-        <mc:Fallback>
+        <mc:Fallback xmlns="">
           <p:sp>
             <p:nvSpPr>
               <p:cNvPr id="9" name="Rectangle 8">
@@ -12525,8 +12526,8 @@
           </p:sp>
         </mc:Fallback>
       </mc:AlternateContent>
-      <mc:AlternateContent xmlns:mc="http://schemas.openxmlformats.org/markup-compatibility/2006">
-        <mc:Choice xmlns:a14="http://schemas.microsoft.com/office/drawing/2010/main" Requires="a14">
+      <mc:AlternateContent xmlns:mc="http://schemas.openxmlformats.org/markup-compatibility/2006" xmlns:a14="http://schemas.microsoft.com/office/drawing/2010/main">
+        <mc:Choice Requires="a14">
           <p:sp>
             <p:nvSpPr>
               <p:cNvPr id="10" name="Rectangle 9">
@@ -13144,7 +13145,7 @@
             </p:txBody>
           </p:sp>
         </mc:Choice>
-        <mc:Fallback>
+        <mc:Fallback xmlns="">
           <p:sp>
             <p:nvSpPr>
               <p:cNvPr id="10" name="Rectangle 9">
@@ -13224,8 +13225,8 @@
           </a:p>
         </p:txBody>
       </p:sp>
-      <mc:AlternateContent xmlns:mc="http://schemas.openxmlformats.org/markup-compatibility/2006">
-        <mc:Choice xmlns:a14="http://schemas.microsoft.com/office/drawing/2010/main" Requires="a14">
+      <mc:AlternateContent xmlns:mc="http://schemas.openxmlformats.org/markup-compatibility/2006" xmlns:a14="http://schemas.microsoft.com/office/drawing/2010/main">
+        <mc:Choice Requires="a14">
           <p:sp>
             <p:nvSpPr>
               <p:cNvPr id="12" name="TextBox 11">
@@ -13272,7 +13273,7 @@
             </p:txBody>
           </p:sp>
         </mc:Choice>
-        <mc:Fallback>
+        <mc:Fallback xmlns="">
           <p:sp>
             <p:nvSpPr>
               <p:cNvPr id="12" name="TextBox 11">
@@ -13420,8 +13421,8 @@
           </a:p>
         </p:txBody>
       </p:sp>
-      <mc:AlternateContent xmlns:mc="http://schemas.openxmlformats.org/markup-compatibility/2006">
-        <mc:Choice xmlns:a14="http://schemas.microsoft.com/office/drawing/2010/main" Requires="a14">
+      <mc:AlternateContent xmlns:mc="http://schemas.openxmlformats.org/markup-compatibility/2006" xmlns:a14="http://schemas.microsoft.com/office/drawing/2010/main">
+        <mc:Choice Requires="a14">
           <p:sp>
             <p:nvSpPr>
               <p:cNvPr id="5" name="TextBox 4">
@@ -13450,6 +13451,7 @@
               </a:bodyPr>
               <a:lstStyle/>
               <a:p>
+                <a:pPr/>
                 <a14:m>
                   <m:oMathPara xmlns:m="http://schemas.openxmlformats.org/officeDocument/2006/math">
                     <m:oMathParaPr>
@@ -14066,7 +14068,7 @@
             </p:txBody>
           </p:sp>
         </mc:Choice>
-        <mc:Fallback>
+        <mc:Fallback xmlns="">
           <p:sp>
             <p:nvSpPr>
               <p:cNvPr id="5" name="TextBox 4">
@@ -14111,8 +14113,8 @@
           </p:sp>
         </mc:Fallback>
       </mc:AlternateContent>
-      <mc:AlternateContent xmlns:mc="http://schemas.openxmlformats.org/markup-compatibility/2006">
-        <mc:Choice xmlns:a14="http://schemas.microsoft.com/office/drawing/2010/main" Requires="a14">
+      <mc:AlternateContent xmlns:mc="http://schemas.openxmlformats.org/markup-compatibility/2006" xmlns:a14="http://schemas.microsoft.com/office/drawing/2010/main">
+        <mc:Choice Requires="a14">
           <p:sp>
             <p:nvSpPr>
               <p:cNvPr id="6" name="TextBox 5">
@@ -14610,19 +14612,7 @@
                       <a:rPr lang="en-US" sz="2400" b="0" i="1" smtClean="0">
                         <a:latin typeface="Cambria Math" panose="02040503050406030204" pitchFamily="18" charset="0"/>
                       </a:rPr>
-                      <m:t>=0.</m:t>
-                    </m:r>
-                    <m:r>
-                      <a:rPr lang="en-US" sz="2400" b="0" i="1" smtClean="0">
-                        <a:latin typeface="Cambria Math" panose="02040503050406030204" pitchFamily="18" charset="0"/>
-                      </a:rPr>
-                      <m:t>3 </m:t>
-                    </m:r>
-                    <m:r>
-                      <a:rPr lang="en-US" sz="2400" b="0" i="1" smtClean="0">
-                        <a:latin typeface="Cambria Math" panose="02040503050406030204" pitchFamily="18" charset="0"/>
-                      </a:rPr>
-                      <m:t>, </m:t>
+                      <m:t>=0.3 , </m:t>
                     </m:r>
                     <m:r>
                       <a:rPr lang="en-US" sz="2400" b="0" i="1" smtClean="0">
@@ -14728,13 +14718,7 @@
                       <a:rPr lang="en-US" sz="2400" b="0" i="1" smtClean="0">
                         <a:latin typeface="Cambria Math" panose="02040503050406030204" pitchFamily="18" charset="0"/>
                       </a:rPr>
-                      <m:t>=0.</m:t>
-                    </m:r>
-                    <m:r>
-                      <a:rPr lang="en-US" sz="2400" b="0" i="1" smtClean="0">
-                        <a:latin typeface="Cambria Math" panose="02040503050406030204" pitchFamily="18" charset="0"/>
-                      </a:rPr>
-                      <m:t>7</m:t>
+                      <m:t>=0.7</m:t>
                     </m:r>
                   </m:oMath>
                 </a14:m>
@@ -14743,7 +14727,7 @@
             </p:txBody>
           </p:sp>
         </mc:Choice>
-        <mc:Fallback>
+        <mc:Fallback xmlns="">
           <p:sp>
             <p:nvSpPr>
               <p:cNvPr id="6" name="TextBox 5">
@@ -14858,8 +14842,8 @@
           </a:p>
         </p:txBody>
       </p:sp>
-      <mc:AlternateContent xmlns:mc="http://schemas.openxmlformats.org/markup-compatibility/2006">
-        <mc:Choice xmlns:a14="http://schemas.microsoft.com/office/drawing/2010/main" Requires="a14">
+      <mc:AlternateContent xmlns:mc="http://schemas.openxmlformats.org/markup-compatibility/2006" xmlns:a14="http://schemas.microsoft.com/office/drawing/2010/main">
+        <mc:Choice Requires="a14">
           <p:sp>
             <p:nvSpPr>
               <p:cNvPr id="9" name="Rectangle 8">
@@ -15305,7 +15289,7 @@
             </p:txBody>
           </p:sp>
         </mc:Choice>
-        <mc:Fallback>
+        <mc:Fallback xmlns="">
           <p:sp>
             <p:nvSpPr>
               <p:cNvPr id="9" name="Rectangle 8">

</xml_diff>